<commit_message>
Add a slide to PP
</commit_message>
<xml_diff>
--- a/Output/MentalHealth_in_the_US.pptx
+++ b/Output/MentalHealth_in_the_US.pptx
@@ -7,6 +7,7 @@
   <p:sldIdLst>
     <p:sldId id="256" r:id="rId2"/>
     <p:sldId id="257" r:id="rId3"/>
+    <p:sldId id="258" r:id="rId4"/>
   </p:sldIdLst>
   <p:sldSz cx="12192000" cy="6858000"/>
   <p:notesSz cx="6858000" cy="9144000"/>
@@ -105,6 +106,11 @@
       </a:defRPr>
     </a:lvl9pPr>
   </p:defaultTextStyle>
+  <p:extLst>
+    <p:ext uri="{EFAFB233-063F-42B5-8137-9DF3F51BA10A}">
+      <p15:sldGuideLst xmlns:p15="http://schemas.microsoft.com/office/powerpoint/2012/main"/>
+    </p:ext>
+  </p:extLst>
 </p:presentation>
 </file>
 
@@ -6105,7 +6111,10 @@
           <a:bodyPr/>
           <a:lstStyle/>
           <a:p>
-            <a:endParaRPr lang="en-CA" dirty="0"/>
+            <a:r>
+              <a:rPr lang="en-CA" dirty="0"/>
+              <a:t>Interactive map of Mental Health in the US by State</a:t>
+            </a:r>
           </a:p>
         </p:txBody>
       </p:sp>
@@ -6134,9 +6143,36 @@
               <a:rPr lang="en-CA" dirty="0">
                 <a:hlinkClick r:id="rId2" action="ppaction://hlinkfile"/>
               </a:rPr>
-              <a:t>Interactive map of Mental Health in US States</a:t>
+              <a:t>Link</a:t>
             </a:r>
             <a:endParaRPr lang="en-CA" dirty="0"/>
+          </a:p>
+          <a:p>
+            <a:r>
+              <a:rPr lang="en-CA" dirty="0"/>
+              <a:t>States with highest severity:</a:t>
+            </a:r>
+          </a:p>
+          <a:p>
+            <a:pPr lvl="1"/>
+            <a:r>
+              <a:rPr lang="en-CA" dirty="0"/>
+              <a:t>Oregon</a:t>
+            </a:r>
+          </a:p>
+          <a:p>
+            <a:pPr lvl="1"/>
+            <a:r>
+              <a:rPr lang="en-CA" dirty="0"/>
+              <a:t>Alabama</a:t>
+            </a:r>
+          </a:p>
+          <a:p>
+            <a:pPr lvl="1"/>
+            <a:r>
+              <a:rPr lang="en-CA" dirty="0"/>
+              <a:t>Kentucky</a:t>
+            </a:r>
           </a:p>
         </p:txBody>
       </p:sp>
@@ -6144,6 +6180,92 @@
     <p:extLst>
       <p:ext uri="{BB962C8B-B14F-4D97-AF65-F5344CB8AC3E}">
         <p14:creationId xmlns:p14="http://schemas.microsoft.com/office/powerpoint/2010/main" val="2223817716"/>
+      </p:ext>
+    </p:extLst>
+  </p:cSld>
+  <p:clrMapOvr>
+    <a:masterClrMapping/>
+  </p:clrMapOvr>
+</p:sld>
+</file>
+
+<file path=ppt/slides/slide3.xml><?xml version="1.0" encoding="utf-8"?>
+<p:sld xmlns:a="http://schemas.openxmlformats.org/drawingml/2006/main" xmlns:r="http://schemas.openxmlformats.org/officeDocument/2006/relationships" xmlns:p="http://schemas.openxmlformats.org/presentationml/2006/main">
+  <p:cSld>
+    <p:spTree>
+      <p:nvGrpSpPr>
+        <p:cNvPr id="1" name=""/>
+        <p:cNvGrpSpPr/>
+        <p:nvPr/>
+      </p:nvGrpSpPr>
+      <p:grpSpPr>
+        <a:xfrm>
+          <a:off x="0" y="0"/>
+          <a:ext cx="0" cy="0"/>
+          <a:chOff x="0" y="0"/>
+          <a:chExt cx="0" cy="0"/>
+        </a:xfrm>
+      </p:grpSpPr>
+      <p:sp>
+        <p:nvSpPr>
+          <p:cNvPr id="2" name="Title 1">
+            <a:extLst>
+              <a:ext uri="{FF2B5EF4-FFF2-40B4-BE49-F238E27FC236}">
+                <a16:creationId xmlns:a16="http://schemas.microsoft.com/office/drawing/2014/main" id="{DE886F02-1799-4896-A55B-7F5D36377B24}"/>
+              </a:ext>
+            </a:extLst>
+          </p:cNvPr>
+          <p:cNvSpPr>
+            <a:spLocks noGrp="1"/>
+          </p:cNvSpPr>
+          <p:nvPr>
+            <p:ph type="title"/>
+          </p:nvPr>
+        </p:nvSpPr>
+        <p:spPr/>
+        <p:txBody>
+          <a:bodyPr/>
+          <a:lstStyle/>
+          <a:p>
+            <a:r>
+              <a:rPr lang="en-CA" dirty="0"/>
+              <a:t>Data sources</a:t>
+            </a:r>
+          </a:p>
+        </p:txBody>
+      </p:sp>
+      <p:sp>
+        <p:nvSpPr>
+          <p:cNvPr id="3" name="Content Placeholder 2">
+            <a:extLst>
+              <a:ext uri="{FF2B5EF4-FFF2-40B4-BE49-F238E27FC236}">
+                <a16:creationId xmlns:a16="http://schemas.microsoft.com/office/drawing/2014/main" id="{5D0A61D0-358A-42C2-8322-C861C1A7F0EE}"/>
+              </a:ext>
+            </a:extLst>
+          </p:cNvPr>
+          <p:cNvSpPr>
+            <a:spLocks noGrp="1"/>
+          </p:cNvSpPr>
+          <p:nvPr>
+            <p:ph idx="1"/>
+          </p:nvPr>
+        </p:nvSpPr>
+        <p:spPr/>
+        <p:txBody>
+          <a:bodyPr/>
+          <a:lstStyle/>
+          <a:p>
+            <a:r>
+              <a:rPr lang="en-CA" dirty="0"/>
+              <a:t>Data.gov</a:t>
+            </a:r>
+          </a:p>
+        </p:txBody>
+      </p:sp>
+    </p:spTree>
+    <p:extLst>
+      <p:ext uri="{BB962C8B-B14F-4D97-AF65-F5344CB8AC3E}">
+        <p14:creationId xmlns:p14="http://schemas.microsoft.com/office/powerpoint/2010/main" val="2090690541"/>
       </p:ext>
     </p:extLst>
   </p:cSld>

</xml_diff>